<commit_message>
Updated the hw6 to ask for a .bash file instead of .sh because of blackboard
</commit_message>
<xml_diff>
--- a/notes/Week12-linux.pptx
+++ b/notes/Week12-linux.pptx
@@ -255,7 +255,7 @@
           <a:p>
             <a:fld id="{C94BF1D3-5036-4D1A-A3B2-025E6980F662}" type="datetimeFigureOut">
               <a:rPr lang="en-US" smtClean="0"/>
-              <a:t>11/16/2020</a:t>
+              <a:t>11/18/2020</a:t>
             </a:fld>
             <a:endParaRPr lang="en-US"/>
           </a:p>
@@ -420,7 +420,7 @@
           <a:p>
             <a:fld id="{FD852303-BCF1-4F7F-83D3-C9EE5BF074C9}" type="datetimeFigureOut">
               <a:rPr lang="en-US" smtClean="0"/>
-              <a:t>11/16/2020</a:t>
+              <a:t>11/18/2020</a:t>
             </a:fld>
             <a:endParaRPr lang="en-US"/>
           </a:p>
@@ -7645,6 +7645,77 @@
               <a:t>23</a:t>
             </a:fld>
             <a:endParaRPr lang="en-US" dirty="0"/>
+          </a:p>
+        </p:txBody>
+      </p:sp>
+      <p:pic>
+        <p:nvPicPr>
+          <p:cNvPr id="8" name="Picture 7" descr="Diagram, text&#10;&#10;Description automatically generated">
+            <a:extLst>
+              <a:ext uri="{FF2B5EF4-FFF2-40B4-BE49-F238E27FC236}">
+                <a16:creationId xmlns:a16="http://schemas.microsoft.com/office/drawing/2014/main" id="{9821B3C9-9FD7-42F8-B3B7-54BF6A6B70AE}"/>
+              </a:ext>
+            </a:extLst>
+          </p:cNvPr>
+          <p:cNvPicPr>
+            <a:picLocks noChangeAspect="1"/>
+          </p:cNvPicPr>
+          <p:nvPr/>
+        </p:nvPicPr>
+        <p:blipFill>
+          <a:blip r:embed="rId2">
+            <a:extLst>
+              <a:ext uri="{28A0092B-C50C-407E-A947-70E740481C1C}">
+                <a14:useLocalDpi xmlns:a14="http://schemas.microsoft.com/office/drawing/2010/main" val="0"/>
+              </a:ext>
+            </a:extLst>
+          </a:blip>
+          <a:stretch>
+            <a:fillRect/>
+          </a:stretch>
+        </p:blipFill>
+        <p:spPr>
+          <a:xfrm>
+            <a:off x="4023519" y="3429000"/>
+            <a:ext cx="3429000" cy="2847975"/>
+          </a:xfrm>
+          <a:prstGeom prst="rect">
+            <a:avLst/>
+          </a:prstGeom>
+        </p:spPr>
+      </p:pic>
+      <p:sp>
+        <p:nvSpPr>
+          <p:cNvPr id="9" name="TextBox 8">
+            <a:extLst>
+              <a:ext uri="{FF2B5EF4-FFF2-40B4-BE49-F238E27FC236}">
+                <a16:creationId xmlns:a16="http://schemas.microsoft.com/office/drawing/2014/main" id="{ACE823D0-9C82-4253-8D16-7D17988B6876}"/>
+              </a:ext>
+            </a:extLst>
+          </p:cNvPr>
+          <p:cNvSpPr txBox="1"/>
+          <p:nvPr/>
+        </p:nvSpPr>
+        <p:spPr>
+          <a:xfrm>
+            <a:off x="594519" y="6538912"/>
+            <a:ext cx="3682483" cy="369332"/>
+          </a:xfrm>
+          <a:prstGeom prst="rect">
+            <a:avLst/>
+          </a:prstGeom>
+          <a:noFill/>
+        </p:spPr>
+        <p:txBody>
+          <a:bodyPr wrap="none" rtlCol="0">
+            <a:spAutoFit/>
+          </a:bodyPr>
+          <a:lstStyle/>
+          <a:p>
+            <a:r>
+              <a:rPr lang="en-US" dirty="0"/>
+              <a:t>Image source: https://xkcd.com/149/</a:t>
+            </a:r>
           </a:p>
         </p:txBody>
       </p:sp>

</xml_diff>

<commit_message>
Made a few notes for next year
</commit_message>
<xml_diff>
--- a/notes/Week12-linux.pptx
+++ b/notes/Week12-linux.pptx
@@ -255,7 +255,7 @@
           <a:p>
             <a:fld id="{C94BF1D3-5036-4D1A-A3B2-025E6980F662}" type="datetimeFigureOut">
               <a:rPr lang="en-US" smtClean="0"/>
-              <a:t>11/18/2020</a:t>
+              <a:t>12/16/2020</a:t>
             </a:fld>
             <a:endParaRPr lang="en-US"/>
           </a:p>
@@ -420,7 +420,7 @@
           <a:p>
             <a:fld id="{FD852303-BCF1-4F7F-83D3-C9EE5BF074C9}" type="datetimeFigureOut">
               <a:rPr lang="en-US" smtClean="0"/>
-              <a:t>11/18/2020</a:t>
+              <a:t>12/16/2020</a:t>
             </a:fld>
             <a:endParaRPr lang="en-US"/>
           </a:p>
@@ -5719,7 +5719,19 @@
             </a:br>
             <a:r>
               <a:rPr lang="en-US" dirty="0"/>
-              <a:t>of directory</a:t>
+              <a:t>of directory (</a:t>
+            </a:r>
+            <a:r>
+              <a:rPr lang="en-US" dirty="0">
+                <a:solidFill>
+                  <a:srgbClr val="FF0000"/>
+                </a:solidFill>
+              </a:rPr>
+              <a:t>very dangerous</a:t>
+            </a:r>
+            <a:r>
+              <a:rPr lang="en-US" dirty="0"/>
+              <a:t>)</a:t>
             </a:r>
           </a:p>
           <a:p>
@@ -8278,7 +8290,7 @@
           <a:p>
             <a:r>
               <a:rPr lang="en-US" dirty="0"/>
-              <a:t>Tutorial to help you write a bash script to count how many times a word appears in </a:t>
+              <a:t>Tutorial to help you write a bash script to count how many lines contain a word in </a:t>
             </a:r>
             <a:r>
               <a:rPr lang="en-US" i="1" dirty="0"/>

</xml_diff>